<commit_message>
updated ppt with minor bullet point fix
</commit_message>
<xml_diff>
--- a/project3.pptx
+++ b/project3.pptx
@@ -73,7 +73,7 @@
         <p:spPr>
           <a:xfrm>
             <a:off x="685800" y="2130480"/>
-            <a:ext cx="7771680" cy="1469160"/>
+            <a:ext cx="7771320" cy="1468800"/>
           </a:xfrm>
           <a:prstGeom prst="rect">
             <a:avLst/>
@@ -110,7 +110,7 @@
         <p:spPr>
           <a:xfrm>
             <a:off x="457200" y="1604520"/>
-            <a:ext cx="8229240" cy="1896840"/>
+            <a:ext cx="8228880" cy="1896840"/>
           </a:xfrm>
           <a:prstGeom prst="rect">
             <a:avLst/>
@@ -146,7 +146,7 @@
         <p:spPr>
           <a:xfrm>
             <a:off x="457200" y="3682080"/>
-            <a:ext cx="8229240" cy="1896840"/>
+            <a:ext cx="8228880" cy="1896840"/>
           </a:xfrm>
           <a:prstGeom prst="rect">
             <a:avLst/>
@@ -204,7 +204,7 @@
         <p:spPr>
           <a:xfrm>
             <a:off x="685800" y="2130480"/>
-            <a:ext cx="7771680" cy="1469160"/>
+            <a:ext cx="7771320" cy="1468800"/>
           </a:xfrm>
           <a:prstGeom prst="rect">
             <a:avLst/>
@@ -241,7 +241,7 @@
         <p:spPr>
           <a:xfrm>
             <a:off x="457200" y="1604520"/>
-            <a:ext cx="4015800" cy="1896840"/>
+            <a:ext cx="4015440" cy="1896840"/>
           </a:xfrm>
           <a:prstGeom prst="rect">
             <a:avLst/>
@@ -276,8 +276,8 @@
         </p:nvSpPr>
         <p:spPr>
           <a:xfrm>
-            <a:off x="4674240" y="1604520"/>
-            <a:ext cx="4015800" cy="1896840"/>
+            <a:off x="4673880" y="1604520"/>
+            <a:ext cx="4015440" cy="1896840"/>
           </a:xfrm>
           <a:prstGeom prst="rect">
             <a:avLst/>
@@ -312,8 +312,8 @@
         </p:nvSpPr>
         <p:spPr>
           <a:xfrm>
-            <a:off x="4674240" y="3682080"/>
-            <a:ext cx="4015800" cy="1896840"/>
+            <a:off x="4673880" y="3682080"/>
+            <a:ext cx="4015440" cy="1896840"/>
           </a:xfrm>
           <a:prstGeom prst="rect">
             <a:avLst/>
@@ -349,7 +349,7 @@
         <p:spPr>
           <a:xfrm>
             <a:off x="457200" y="3682080"/>
-            <a:ext cx="4015800" cy="1896840"/>
+            <a:ext cx="4015440" cy="1896840"/>
           </a:xfrm>
           <a:prstGeom prst="rect">
             <a:avLst/>
@@ -407,7 +407,7 @@
         <p:spPr>
           <a:xfrm>
             <a:off x="685800" y="2130480"/>
-            <a:ext cx="7771680" cy="1469160"/>
+            <a:ext cx="7771320" cy="1468800"/>
           </a:xfrm>
           <a:prstGeom prst="rect">
             <a:avLst/>
@@ -444,7 +444,7 @@
         <p:spPr>
           <a:xfrm>
             <a:off x="457200" y="1604520"/>
-            <a:ext cx="8229240" cy="3977280"/>
+            <a:ext cx="8228880" cy="3976920"/>
           </a:xfrm>
           <a:prstGeom prst="rect">
             <a:avLst/>
@@ -480,7 +480,7 @@
         <p:spPr>
           <a:xfrm>
             <a:off x="457200" y="1604520"/>
-            <a:ext cx="8229240" cy="3977280"/>
+            <a:ext cx="8228880" cy="3976920"/>
           </a:xfrm>
           <a:prstGeom prst="rect">
             <a:avLst/>
@@ -515,8 +515,8 @@
         </p:blipFill>
         <p:spPr>
           <a:xfrm>
-            <a:off x="2079000" y="1604520"/>
-            <a:ext cx="4984920" cy="3977280"/>
+            <a:off x="2079360" y="1604160"/>
+            <a:ext cx="4984200" cy="3976920"/>
           </a:xfrm>
           <a:prstGeom prst="rect">
             <a:avLst/>
@@ -538,8 +538,8 @@
         </p:blipFill>
         <p:spPr>
           <a:xfrm>
-            <a:off x="2079000" y="1604520"/>
-            <a:ext cx="4984920" cy="3977280"/>
+            <a:off x="2079360" y="1604160"/>
+            <a:ext cx="4984200" cy="3976920"/>
           </a:xfrm>
           <a:prstGeom prst="rect">
             <a:avLst/>
@@ -584,7 +584,7 @@
         <p:spPr>
           <a:xfrm>
             <a:off x="685800" y="2130480"/>
-            <a:ext cx="7771680" cy="1469160"/>
+            <a:ext cx="7771320" cy="1468800"/>
           </a:xfrm>
           <a:prstGeom prst="rect">
             <a:avLst/>
@@ -621,7 +621,7 @@
         <p:spPr>
           <a:xfrm>
             <a:off x="457200" y="1604520"/>
-            <a:ext cx="8229240" cy="3977280"/>
+            <a:ext cx="8228880" cy="3976920"/>
           </a:xfrm>
           <a:prstGeom prst="rect">
             <a:avLst/>
@@ -680,7 +680,7 @@
         <p:spPr>
           <a:xfrm>
             <a:off x="685800" y="2130480"/>
-            <a:ext cx="7771680" cy="1469160"/>
+            <a:ext cx="7771320" cy="1468800"/>
           </a:xfrm>
           <a:prstGeom prst="rect">
             <a:avLst/>
@@ -717,7 +717,7 @@
         <p:spPr>
           <a:xfrm>
             <a:off x="457200" y="1604520"/>
-            <a:ext cx="8229240" cy="3977280"/>
+            <a:ext cx="8228880" cy="3976920"/>
           </a:xfrm>
           <a:prstGeom prst="rect">
             <a:avLst/>
@@ -775,7 +775,7 @@
         <p:spPr>
           <a:xfrm>
             <a:off x="685800" y="2130480"/>
-            <a:ext cx="7771680" cy="1469160"/>
+            <a:ext cx="7771320" cy="1468800"/>
           </a:xfrm>
           <a:prstGeom prst="rect">
             <a:avLst/>
@@ -812,7 +812,7 @@
         <p:spPr>
           <a:xfrm>
             <a:off x="457200" y="1604520"/>
-            <a:ext cx="4015800" cy="3977280"/>
+            <a:ext cx="4015440" cy="3976920"/>
           </a:xfrm>
           <a:prstGeom prst="rect">
             <a:avLst/>
@@ -847,8 +847,8 @@
         </p:nvSpPr>
         <p:spPr>
           <a:xfrm>
-            <a:off x="4674240" y="1604520"/>
-            <a:ext cx="4015800" cy="3977280"/>
+            <a:off x="4673880" y="1604520"/>
+            <a:ext cx="4015440" cy="3976920"/>
           </a:xfrm>
           <a:prstGeom prst="rect">
             <a:avLst/>
@@ -906,7 +906,7 @@
         <p:spPr>
           <a:xfrm>
             <a:off x="685800" y="2130480"/>
-            <a:ext cx="7771680" cy="1469160"/>
+            <a:ext cx="7771320" cy="1468800"/>
           </a:xfrm>
           <a:prstGeom prst="rect">
             <a:avLst/>
@@ -965,7 +965,7 @@
         <p:spPr>
           <a:xfrm>
             <a:off x="685800" y="2130480"/>
-            <a:ext cx="7771680" cy="6811560"/>
+            <a:ext cx="7771320" cy="6809760"/>
           </a:xfrm>
           <a:prstGeom prst="rect">
             <a:avLst/>
@@ -1024,7 +1024,7 @@
         <p:spPr>
           <a:xfrm>
             <a:off x="685800" y="2130480"/>
-            <a:ext cx="7771680" cy="1469160"/>
+            <a:ext cx="7771320" cy="1468800"/>
           </a:xfrm>
           <a:prstGeom prst="rect">
             <a:avLst/>
@@ -1061,7 +1061,7 @@
         <p:spPr>
           <a:xfrm>
             <a:off x="457200" y="1604520"/>
-            <a:ext cx="4015800" cy="1896840"/>
+            <a:ext cx="4015440" cy="1896840"/>
           </a:xfrm>
           <a:prstGeom prst="rect">
             <a:avLst/>
@@ -1097,7 +1097,7 @@
         <p:spPr>
           <a:xfrm>
             <a:off x="457200" y="3682080"/>
-            <a:ext cx="4015800" cy="1896840"/>
+            <a:ext cx="4015440" cy="1896840"/>
           </a:xfrm>
           <a:prstGeom prst="rect">
             <a:avLst/>
@@ -1132,8 +1132,8 @@
         </p:nvSpPr>
         <p:spPr>
           <a:xfrm>
-            <a:off x="4674240" y="1604520"/>
-            <a:ext cx="4015800" cy="3977280"/>
+            <a:off x="4673880" y="1604520"/>
+            <a:ext cx="4015440" cy="3976920"/>
           </a:xfrm>
           <a:prstGeom prst="rect">
             <a:avLst/>
@@ -1191,7 +1191,7 @@
         <p:spPr>
           <a:xfrm>
             <a:off x="685800" y="2130480"/>
-            <a:ext cx="7771680" cy="1469160"/>
+            <a:ext cx="7771320" cy="1468800"/>
           </a:xfrm>
           <a:prstGeom prst="rect">
             <a:avLst/>
@@ -1228,7 +1228,7 @@
         <p:spPr>
           <a:xfrm>
             <a:off x="457200" y="1604520"/>
-            <a:ext cx="4015800" cy="3977280"/>
+            <a:ext cx="4015440" cy="3976920"/>
           </a:xfrm>
           <a:prstGeom prst="rect">
             <a:avLst/>
@@ -1263,8 +1263,8 @@
         </p:nvSpPr>
         <p:spPr>
           <a:xfrm>
-            <a:off x="4674240" y="1604520"/>
-            <a:ext cx="4015800" cy="1896840"/>
+            <a:off x="4673880" y="1604520"/>
+            <a:ext cx="4015440" cy="1896840"/>
           </a:xfrm>
           <a:prstGeom prst="rect">
             <a:avLst/>
@@ -1299,8 +1299,8 @@
         </p:nvSpPr>
         <p:spPr>
           <a:xfrm>
-            <a:off x="4674240" y="3682080"/>
-            <a:ext cx="4015800" cy="1896840"/>
+            <a:off x="4673880" y="3682080"/>
+            <a:ext cx="4015440" cy="1896840"/>
           </a:xfrm>
           <a:prstGeom prst="rect">
             <a:avLst/>
@@ -1358,7 +1358,7 @@
         <p:spPr>
           <a:xfrm>
             <a:off x="685800" y="2130480"/>
-            <a:ext cx="7771680" cy="1469160"/>
+            <a:ext cx="7771320" cy="1468800"/>
           </a:xfrm>
           <a:prstGeom prst="rect">
             <a:avLst/>
@@ -1395,7 +1395,7 @@
         <p:spPr>
           <a:xfrm>
             <a:off x="457200" y="1604520"/>
-            <a:ext cx="4015800" cy="1896840"/>
+            <a:ext cx="4015440" cy="1896840"/>
           </a:xfrm>
           <a:prstGeom prst="rect">
             <a:avLst/>
@@ -1430,8 +1430,8 @@
         </p:nvSpPr>
         <p:spPr>
           <a:xfrm>
-            <a:off x="4674240" y="1604520"/>
-            <a:ext cx="4015800" cy="1896840"/>
+            <a:off x="4673880" y="1604520"/>
+            <a:ext cx="4015440" cy="1896840"/>
           </a:xfrm>
           <a:prstGeom prst="rect">
             <a:avLst/>
@@ -1467,7 +1467,7 @@
         <p:spPr>
           <a:xfrm>
             <a:off x="457200" y="3682080"/>
-            <a:ext cx="8229240" cy="1896840"/>
+            <a:ext cx="8228880" cy="1896840"/>
           </a:xfrm>
           <a:prstGeom prst="rect">
             <a:avLst/>
@@ -1535,7 +1535,7 @@
         <p:spPr>
           <a:xfrm>
             <a:off x="685800" y="2130480"/>
-            <a:ext cx="7771680" cy="1469160"/>
+            <a:ext cx="7771320" cy="1468800"/>
           </a:xfrm>
           <a:prstGeom prst="rect">
             <a:avLst/>
@@ -1572,7 +1572,7 @@
         <p:spPr>
           <a:xfrm>
             <a:off x="457200" y="1604520"/>
-            <a:ext cx="8229240" cy="3977280"/>
+            <a:ext cx="8228880" cy="3976920"/>
           </a:xfrm>
           <a:prstGeom prst="rect">
             <a:avLst/>
@@ -1590,7 +1590,7 @@
               <a:buChar char=""/>
             </a:pPr>
             <a:r>
-              <a:rPr b="0" lang="en-US" sz="3200" spc="-1" strike="noStrike">
+              <a:rPr b="0" lang="en-US" sz="1800" spc="-1" strike="noStrike">
                 <a:solidFill>
                   <a:srgbClr val="000000"/>
                 </a:solidFill>
@@ -1603,7 +1603,7 @@
               </a:rPr>
               <a:t>Click to edit the outline text format</a:t>
             </a:r>
-            <a:endParaRPr b="0" lang="en-US" sz="3200" spc="-1" strike="noStrike">
+            <a:endParaRPr b="0" lang="en-US" sz="1800" spc="-1" strike="noStrike">
               <a:solidFill>
                 <a:srgbClr val="000000"/>
               </a:solidFill>
@@ -1625,7 +1625,7 @@
               <a:buChar char=""/>
             </a:pPr>
             <a:r>
-              <a:rPr b="0" lang="en-US" sz="2800" spc="-1" strike="noStrike">
+              <a:rPr b="0" lang="en-US" sz="1800" spc="-1" strike="noStrike">
                 <a:solidFill>
                   <a:srgbClr val="000000"/>
                 </a:solidFill>
@@ -1638,7 +1638,7 @@
               </a:rPr>
               <a:t>Second Outline Level</a:t>
             </a:r>
-            <a:endParaRPr b="0" lang="en-US" sz="2800" spc="-1" strike="noStrike">
+            <a:endParaRPr b="0" lang="en-US" sz="1800" spc="-1" strike="noStrike">
               <a:solidFill>
                 <a:srgbClr val="000000"/>
               </a:solidFill>
@@ -1660,7 +1660,7 @@
               <a:buChar char=""/>
             </a:pPr>
             <a:r>
-              <a:rPr b="0" lang="en-US" sz="2400" spc="-1" strike="noStrike">
+              <a:rPr b="0" lang="en-US" sz="1800" spc="-1" strike="noStrike">
                 <a:solidFill>
                   <a:srgbClr val="000000"/>
                 </a:solidFill>
@@ -1673,7 +1673,7 @@
               </a:rPr>
               <a:t>Third Outline Level</a:t>
             </a:r>
-            <a:endParaRPr b="0" lang="en-US" sz="2400" spc="-1" strike="noStrike">
+            <a:endParaRPr b="0" lang="en-US" sz="1800" spc="-1" strike="noStrike">
               <a:solidFill>
                 <a:srgbClr val="000000"/>
               </a:solidFill>
@@ -1695,7 +1695,7 @@
               <a:buChar char=""/>
             </a:pPr>
             <a:r>
-              <a:rPr b="0" lang="en-US" sz="2000" spc="-1" strike="noStrike">
+              <a:rPr b="0" lang="en-US" sz="1800" spc="-1" strike="noStrike">
                 <a:solidFill>
                   <a:srgbClr val="000000"/>
                 </a:solidFill>
@@ -1708,7 +1708,7 @@
               </a:rPr>
               <a:t>Fourth Outline Level</a:t>
             </a:r>
-            <a:endParaRPr b="0" lang="en-US" sz="2000" spc="-1" strike="noStrike">
+            <a:endParaRPr b="0" lang="en-US" sz="1800" spc="-1" strike="noStrike">
               <a:solidFill>
                 <a:srgbClr val="000000"/>
               </a:solidFill>
@@ -1730,7 +1730,7 @@
               <a:buChar char=""/>
             </a:pPr>
             <a:r>
-              <a:rPr b="0" lang="en-US" sz="2000" spc="-1" strike="noStrike">
+              <a:rPr b="0" lang="en-US" sz="1800" spc="-1" strike="noStrike">
                 <a:solidFill>
                   <a:srgbClr val="000000"/>
                 </a:solidFill>
@@ -1743,7 +1743,7 @@
               </a:rPr>
               <a:t>Fifth Outline Level</a:t>
             </a:r>
-            <a:endParaRPr b="0" lang="en-US" sz="2000" spc="-1" strike="noStrike">
+            <a:endParaRPr b="0" lang="en-US" sz="1800" spc="-1" strike="noStrike">
               <a:solidFill>
                 <a:srgbClr val="000000"/>
               </a:solidFill>
@@ -1765,7 +1765,7 @@
               <a:buChar char=""/>
             </a:pPr>
             <a:r>
-              <a:rPr b="0" lang="en-US" sz="2000" spc="-1" strike="noStrike">
+              <a:rPr b="0" lang="en-US" sz="1800" spc="-1" strike="noStrike">
                 <a:solidFill>
                   <a:srgbClr val="000000"/>
                 </a:solidFill>
@@ -1778,7 +1778,7 @@
               </a:rPr>
               <a:t>Sixth Outline Level</a:t>
             </a:r>
-            <a:endParaRPr b="0" lang="en-US" sz="2000" spc="-1" strike="noStrike">
+            <a:endParaRPr b="0" lang="en-US" sz="1800" spc="-1" strike="noStrike">
               <a:solidFill>
                 <a:srgbClr val="000000"/>
               </a:solidFill>
@@ -1800,7 +1800,7 @@
               <a:buChar char=""/>
             </a:pPr>
             <a:r>
-              <a:rPr b="0" lang="en-US" sz="2000" spc="-1" strike="noStrike">
+              <a:rPr b="0" lang="en-US" sz="1800" spc="-1" strike="noStrike">
                 <a:solidFill>
                   <a:srgbClr val="000000"/>
                 </a:solidFill>
@@ -1813,7 +1813,7 @@
               </a:rPr>
               <a:t>Seventh Outline Level</a:t>
             </a:r>
-            <a:endParaRPr b="0" lang="en-US" sz="2000" spc="-1" strike="noStrike">
+            <a:endParaRPr b="0" lang="en-US" sz="1800" spc="-1" strike="noStrike">
               <a:solidFill>
                 <a:srgbClr val="000000"/>
               </a:solidFill>
@@ -1873,7 +1873,7 @@
         <p:spPr>
           <a:xfrm>
             <a:off x="685800" y="609480"/>
-            <a:ext cx="7771680" cy="1065960"/>
+            <a:ext cx="7771320" cy="1065600"/>
           </a:xfrm>
           <a:prstGeom prst="rect">
             <a:avLst/>
@@ -1903,6 +1903,7 @@
                   </a:solidFill>
                 </a:uFill>
                 <a:latin typeface="Calibri"/>
+                <a:ea typeface="DejaVu Sans"/>
               </a:rPr>
               <a:t>Data 607, Fall 2017</a:t>
             </a:r>
@@ -1930,6 +1931,7 @@
                   </a:solidFill>
                 </a:uFill>
                 <a:latin typeface="Calibri"/>
+                <a:ea typeface="DejaVu Sans"/>
               </a:rPr>
               <a:t>Project 3 - </a:t>
             </a:r>
@@ -1944,6 +1946,7 @@
                   </a:solidFill>
                 </a:uFill>
                 <a:latin typeface="Calibri"/>
+                <a:ea typeface="DejaVu Sans"/>
               </a:rPr>
               <a:t>Most Valued Data Science Skills </a:t>
             </a:r>
@@ -1988,7 +1991,7 @@
         <p:spPr>
           <a:xfrm>
             <a:off x="1371600" y="2514600"/>
-            <a:ext cx="6400080" cy="1751760"/>
+            <a:ext cx="6399720" cy="1751400"/>
           </a:xfrm>
           <a:prstGeom prst="rect">
             <a:avLst/>
@@ -2023,6 +2026,7 @@
                   </a:solidFill>
                 </a:uFill>
                 <a:latin typeface="Calibri"/>
+                <a:ea typeface="DejaVu Sans"/>
               </a:rPr>
               <a:t>Group 7</a:t>
             </a:r>
@@ -2349,7 +2353,7 @@
         <p:spPr>
           <a:xfrm>
             <a:off x="609480" y="380880"/>
-            <a:ext cx="7771680" cy="761400"/>
+            <a:ext cx="7771320" cy="761040"/>
           </a:xfrm>
           <a:prstGeom prst="rect">
             <a:avLst/>
@@ -2379,6 +2383,7 @@
                   </a:solidFill>
                 </a:uFill>
                 <a:latin typeface="Calibri"/>
+                <a:ea typeface="DejaVu Sans"/>
               </a:rPr>
               <a:t>Data 607, Fall 2017</a:t>
             </a:r>
@@ -2406,6 +2411,7 @@
                   </a:solidFill>
                 </a:uFill>
                 <a:latin typeface="Calibri"/>
+                <a:ea typeface="DejaVu Sans"/>
               </a:rPr>
               <a:t>Project 3 - </a:t>
             </a:r>
@@ -2420,6 +2426,7 @@
                   </a:solidFill>
                 </a:uFill>
                 <a:latin typeface="Calibri"/>
+                <a:ea typeface="DejaVu Sans"/>
               </a:rPr>
               <a:t>Most Valued Data Science Skills </a:t>
             </a:r>
@@ -2464,7 +2471,7 @@
         <p:spPr>
           <a:xfrm>
             <a:off x="2438280" y="6019920"/>
-            <a:ext cx="6400080" cy="598680"/>
+            <a:ext cx="6399720" cy="598320"/>
           </a:xfrm>
           <a:prstGeom prst="rect">
             <a:avLst/>
@@ -2499,6 +2506,7 @@
                   </a:solidFill>
                 </a:uFill>
                 <a:latin typeface="Calibri"/>
+                <a:ea typeface="DejaVu Sans"/>
               </a:rPr>
               <a:t>Group 7</a:t>
             </a:r>
@@ -2531,6 +2539,7 @@
                   </a:solidFill>
                 </a:uFill>
                 <a:latin typeface="Calibri"/>
+                <a:ea typeface="DejaVu Sans"/>
               </a:rPr>
               <a:t>Albina Gallyavova, John Grando, Mehdi Khan, Olga Fornicheva, Yijian Lu,</a:t>
             </a:r>
@@ -2609,7 +2618,7 @@
         <p:spPr>
           <a:xfrm>
             <a:off x="609480" y="990720"/>
-            <a:ext cx="7238160" cy="1216080"/>
+            <a:ext cx="7237800" cy="1215720"/>
           </a:xfrm>
           <a:prstGeom prst="rect">
             <a:avLst/>
@@ -2722,7 +2731,7 @@
         <p:spPr>
           <a:xfrm>
             <a:off x="155520" y="-3070080"/>
-            <a:ext cx="6400080" cy="6400080"/>
+            <a:ext cx="6399720" cy="6399720"/>
           </a:xfrm>
           <a:prstGeom prst="rect">
             <a:avLst/>
@@ -2748,7 +2757,7 @@
         <p:spPr>
           <a:xfrm>
             <a:off x="307800" y="-2917800"/>
-            <a:ext cx="6400080" cy="6400080"/>
+            <a:ext cx="6399720" cy="6399720"/>
           </a:xfrm>
           <a:prstGeom prst="rect">
             <a:avLst/>
@@ -2774,7 +2783,7 @@
         <p:spPr>
           <a:xfrm>
             <a:off x="460440" y="-2765520"/>
-            <a:ext cx="6400080" cy="6400080"/>
+            <a:ext cx="6399720" cy="6399720"/>
           </a:xfrm>
           <a:prstGeom prst="rect">
             <a:avLst/>
@@ -2804,7 +2813,7 @@
         <p:spPr>
           <a:xfrm>
             <a:off x="1554480" y="2483640"/>
-            <a:ext cx="5349240" cy="3734280"/>
+            <a:ext cx="5348880" cy="3733920"/>
           </a:xfrm>
           <a:prstGeom prst="rect">
             <a:avLst/>
@@ -2872,7 +2881,7 @@
         <p:spPr>
           <a:xfrm>
             <a:off x="609480" y="380880"/>
-            <a:ext cx="7771680" cy="761400"/>
+            <a:ext cx="7771320" cy="761040"/>
           </a:xfrm>
           <a:prstGeom prst="rect">
             <a:avLst/>
@@ -2902,6 +2911,7 @@
                   </a:solidFill>
                 </a:uFill>
                 <a:latin typeface="Calibri"/>
+                <a:ea typeface="DejaVu Sans"/>
               </a:rPr>
               <a:t>Data 607, Fall 2017</a:t>
             </a:r>
@@ -2929,6 +2939,7 @@
                   </a:solidFill>
                 </a:uFill>
                 <a:latin typeface="Calibri"/>
+                <a:ea typeface="DejaVu Sans"/>
               </a:rPr>
               <a:t>Project 3 - </a:t>
             </a:r>
@@ -2943,6 +2954,7 @@
                   </a:solidFill>
                 </a:uFill>
                 <a:latin typeface="Calibri"/>
+                <a:ea typeface="DejaVu Sans"/>
               </a:rPr>
               <a:t>Most Valued Data Science Skills </a:t>
             </a:r>
@@ -2987,7 +2999,7 @@
         <p:spPr>
           <a:xfrm>
             <a:off x="2438280" y="6019920"/>
-            <a:ext cx="6400080" cy="598680"/>
+            <a:ext cx="6399720" cy="598320"/>
           </a:xfrm>
           <a:prstGeom prst="rect">
             <a:avLst/>
@@ -3022,6 +3034,7 @@
                   </a:solidFill>
                 </a:uFill>
                 <a:latin typeface="Calibri"/>
+                <a:ea typeface="DejaVu Sans"/>
               </a:rPr>
               <a:t>Group 7</a:t>
             </a:r>
@@ -3054,6 +3067,7 @@
                   </a:solidFill>
                 </a:uFill>
                 <a:latin typeface="Calibri"/>
+                <a:ea typeface="DejaVu Sans"/>
               </a:rPr>
               <a:t>Albina Gallyavova, John Grando, Mehdi Khan, Olga Fornicheva, Yijian Lu,</a:t>
             </a:r>
@@ -3098,7 +3112,7 @@
         <p:spPr>
           <a:xfrm>
             <a:off x="665640" y="1173240"/>
-            <a:ext cx="4342680" cy="364320"/>
+            <a:ext cx="4342320" cy="363960"/>
           </a:xfrm>
           <a:prstGeom prst="rect">
             <a:avLst/>
@@ -3194,7 +3208,7 @@
         <p:spPr>
           <a:xfrm>
             <a:off x="668520" y="1447920"/>
-            <a:ext cx="7238160" cy="5386320"/>
+            <a:ext cx="7237800" cy="5385960"/>
           </a:xfrm>
           <a:prstGeom prst="rect">
             <a:avLst/>
@@ -3297,7 +3311,7 @@
             </a:endParaRPr>
           </a:p>
           <a:p>
-            <a:pPr marL="285840" indent="-285120">
+            <a:pPr marL="285840" indent="-284760">
               <a:lnSpc>
                 <a:spcPct val="100000"/>
               </a:lnSpc>
@@ -3335,7 +3349,7 @@
             </a:endParaRPr>
           </a:p>
           <a:p>
-            <a:pPr lvl="2" marL="648000" indent="-215640">
+            <a:pPr lvl="2" marL="648000" indent="-215280">
               <a:lnSpc>
                 <a:spcPct val="100000"/>
               </a:lnSpc>
@@ -3374,7 +3388,7 @@
             </a:endParaRPr>
           </a:p>
           <a:p>
-            <a:pPr lvl="2" marL="648000" indent="-215640">
+            <a:pPr lvl="2" marL="648000" indent="-215280">
               <a:lnSpc>
                 <a:spcPct val="100000"/>
               </a:lnSpc>
@@ -3413,7 +3427,7 @@
             </a:endParaRPr>
           </a:p>
           <a:p>
-            <a:pPr marL="285840" indent="-285120">
+            <a:pPr marL="285840" indent="-284760">
               <a:lnSpc>
                 <a:spcPct val="100000"/>
               </a:lnSpc>
@@ -3451,7 +3465,7 @@
             </a:endParaRPr>
           </a:p>
           <a:p>
-            <a:pPr marL="285840" indent="-285120">
+            <a:pPr marL="285840" indent="-284760">
               <a:lnSpc>
                 <a:spcPct val="100000"/>
               </a:lnSpc>
@@ -3489,7 +3503,7 @@
             </a:endParaRPr>
           </a:p>
           <a:p>
-            <a:pPr marL="285840" indent="-285120">
+            <a:pPr marL="285840" indent="-284760">
               <a:lnSpc>
                 <a:spcPct val="100000"/>
               </a:lnSpc>
@@ -3527,7 +3541,7 @@
             </a:endParaRPr>
           </a:p>
           <a:p>
-            <a:pPr marL="285840" indent="-285120">
+            <a:pPr marL="285840" indent="-284760">
               <a:lnSpc>
                 <a:spcPct val="100000"/>
               </a:lnSpc>
@@ -3565,7 +3579,7 @@
             </a:endParaRPr>
           </a:p>
           <a:p>
-            <a:pPr marL="285840" indent="-285120">
+            <a:pPr marL="285840" indent="-284760">
               <a:lnSpc>
                 <a:spcPct val="100000"/>
               </a:lnSpc>
@@ -3603,7 +3617,7 @@
             </a:endParaRPr>
           </a:p>
           <a:p>
-            <a:pPr lvl="2" marL="648000" indent="-215640">
+            <a:pPr lvl="2" marL="648000" indent="-215280">
               <a:lnSpc>
                 <a:spcPct val="100000"/>
               </a:lnSpc>
@@ -3642,7 +3656,7 @@
             </a:endParaRPr>
           </a:p>
           <a:p>
-            <a:pPr lvl="2" marL="648000" indent="-215640">
+            <a:pPr lvl="2" marL="648000" indent="-215280">
               <a:lnSpc>
                 <a:spcPct val="100000"/>
               </a:lnSpc>
@@ -3681,7 +3695,7 @@
             </a:endParaRPr>
           </a:p>
           <a:p>
-            <a:pPr lvl="3" marL="864000" indent="-215640">
+            <a:pPr lvl="2" marL="648000" indent="-215280">
               <a:lnSpc>
                 <a:spcPct val="100000"/>
               </a:lnSpc>
@@ -3797,7 +3811,7 @@
         <p:spPr>
           <a:xfrm>
             <a:off x="609480" y="380880"/>
-            <a:ext cx="7771680" cy="761400"/>
+            <a:ext cx="7771320" cy="761040"/>
           </a:xfrm>
           <a:prstGeom prst="rect">
             <a:avLst/>
@@ -3827,6 +3841,7 @@
                   </a:solidFill>
                 </a:uFill>
                 <a:latin typeface="Calibri"/>
+                <a:ea typeface="DejaVu Sans"/>
               </a:rPr>
               <a:t>Data 607, Fall 2017</a:t>
             </a:r>
@@ -3854,6 +3869,7 @@
                   </a:solidFill>
                 </a:uFill>
                 <a:latin typeface="Calibri"/>
+                <a:ea typeface="DejaVu Sans"/>
               </a:rPr>
               <a:t>Project 3 - </a:t>
             </a:r>
@@ -3868,6 +3884,7 @@
                   </a:solidFill>
                 </a:uFill>
                 <a:latin typeface="Calibri"/>
+                <a:ea typeface="DejaVu Sans"/>
               </a:rPr>
               <a:t>Most Valued Data Science Skills </a:t>
             </a:r>
@@ -3912,7 +3929,7 @@
         <p:spPr>
           <a:xfrm>
             <a:off x="2438280" y="6019920"/>
-            <a:ext cx="6400080" cy="598680"/>
+            <a:ext cx="6399720" cy="598320"/>
           </a:xfrm>
           <a:prstGeom prst="rect">
             <a:avLst/>
@@ -3947,6 +3964,7 @@
                   </a:solidFill>
                 </a:uFill>
                 <a:latin typeface="Calibri"/>
+                <a:ea typeface="DejaVu Sans"/>
               </a:rPr>
               <a:t>Group 7</a:t>
             </a:r>
@@ -3979,6 +3997,7 @@
                   </a:solidFill>
                 </a:uFill>
                 <a:latin typeface="Calibri"/>
+                <a:ea typeface="DejaVu Sans"/>
               </a:rPr>
               <a:t>Albina Gallyavova, John Grando, Mehdi Khan, Olga Fornicheva, Yijian Lu,</a:t>
             </a:r>
@@ -4057,7 +4076,7 @@
         <p:spPr>
           <a:xfrm>
             <a:off x="609480" y="1143000"/>
-            <a:ext cx="7238160" cy="4562640"/>
+            <a:ext cx="7237800" cy="4562280"/>
           </a:xfrm>
           <a:prstGeom prst="rect">
             <a:avLst/>
@@ -4160,7 +4179,7 @@
             </a:endParaRPr>
           </a:p>
           <a:p>
-            <a:pPr marL="285840" indent="-285120">
+            <a:pPr marL="285840" indent="-284760">
               <a:lnSpc>
                 <a:spcPct val="100000"/>
               </a:lnSpc>
@@ -4216,7 +4235,7 @@
             </a:endParaRPr>
           </a:p>
           <a:p>
-            <a:pPr marL="285840" indent="-285120">
+            <a:pPr marL="285840" indent="-284760">
               <a:lnSpc>
                 <a:spcPct val="100000"/>
               </a:lnSpc>
@@ -4272,7 +4291,7 @@
             </a:endParaRPr>
           </a:p>
           <a:p>
-            <a:pPr marL="285840" indent="-285120">
+            <a:pPr marL="285840" indent="-284760">
               <a:lnSpc>
                 <a:spcPct val="100000"/>
               </a:lnSpc>
@@ -4328,7 +4347,7 @@
             </a:endParaRPr>
           </a:p>
           <a:p>
-            <a:pPr marL="285840" indent="-285120">
+            <a:pPr marL="285840" indent="-284760">
               <a:lnSpc>
                 <a:spcPct val="100000"/>
               </a:lnSpc>
@@ -4425,7 +4444,7 @@
         <p:spPr>
           <a:xfrm>
             <a:off x="609480" y="380880"/>
-            <a:ext cx="7771680" cy="761400"/>
+            <a:ext cx="7771320" cy="761040"/>
           </a:xfrm>
           <a:prstGeom prst="rect">
             <a:avLst/>
@@ -4455,6 +4474,7 @@
                   </a:solidFill>
                 </a:uFill>
                 <a:latin typeface="Calibri"/>
+                <a:ea typeface="DejaVu Sans"/>
               </a:rPr>
               <a:t>Data 607, Fall 2017</a:t>
             </a:r>
@@ -4482,6 +4502,7 @@
                   </a:solidFill>
                 </a:uFill>
                 <a:latin typeface="Calibri"/>
+                <a:ea typeface="DejaVu Sans"/>
               </a:rPr>
               <a:t>Project 3 - </a:t>
             </a:r>
@@ -4496,6 +4517,7 @@
                   </a:solidFill>
                 </a:uFill>
                 <a:latin typeface="Calibri"/>
+                <a:ea typeface="DejaVu Sans"/>
               </a:rPr>
               <a:t>Most Valued Data Science Skills </a:t>
             </a:r>
@@ -4540,7 +4562,7 @@
         <p:spPr>
           <a:xfrm>
             <a:off x="2438280" y="6019920"/>
-            <a:ext cx="6400080" cy="598680"/>
+            <a:ext cx="6399720" cy="598320"/>
           </a:xfrm>
           <a:prstGeom prst="rect">
             <a:avLst/>
@@ -4575,6 +4597,7 @@
                   </a:solidFill>
                 </a:uFill>
                 <a:latin typeface="Calibri"/>
+                <a:ea typeface="DejaVu Sans"/>
               </a:rPr>
               <a:t>Group 7</a:t>
             </a:r>
@@ -4607,6 +4630,7 @@
                   </a:solidFill>
                 </a:uFill>
                 <a:latin typeface="Calibri"/>
+                <a:ea typeface="DejaVu Sans"/>
               </a:rPr>
               <a:t>Albina Gallyavova, John Grando, Mehdi Khan, Olga Fornicheva, Yijian Lu,</a:t>
             </a:r>
@@ -4685,7 +4709,7 @@
         <p:spPr>
           <a:xfrm>
             <a:off x="609480" y="1143000"/>
-            <a:ext cx="7238160" cy="638640"/>
+            <a:ext cx="7237800" cy="638280"/>
           </a:xfrm>
           <a:prstGeom prst="rect">
             <a:avLst/>
@@ -4769,7 +4793,7 @@
         <p:spPr>
           <a:xfrm>
             <a:off x="2705040" y="1523880"/>
-            <a:ext cx="3357000" cy="4647600"/>
+            <a:ext cx="3356640" cy="4647240"/>
           </a:xfrm>
           <a:prstGeom prst="rect">
             <a:avLst/>
@@ -4837,7 +4861,7 @@
         <p:spPr>
           <a:xfrm>
             <a:off x="609480" y="380880"/>
-            <a:ext cx="7771680" cy="761400"/>
+            <a:ext cx="7771320" cy="761040"/>
           </a:xfrm>
           <a:prstGeom prst="rect">
             <a:avLst/>
@@ -4867,6 +4891,7 @@
                   </a:solidFill>
                 </a:uFill>
                 <a:latin typeface="Calibri"/>
+                <a:ea typeface="DejaVu Sans"/>
               </a:rPr>
               <a:t>Data 607, Fall 2017</a:t>
             </a:r>
@@ -4894,6 +4919,7 @@
                   </a:solidFill>
                 </a:uFill>
                 <a:latin typeface="Calibri"/>
+                <a:ea typeface="DejaVu Sans"/>
               </a:rPr>
               <a:t>Project 3 - </a:t>
             </a:r>
@@ -4908,6 +4934,7 @@
                   </a:solidFill>
                 </a:uFill>
                 <a:latin typeface="Calibri"/>
+                <a:ea typeface="DejaVu Sans"/>
               </a:rPr>
               <a:t>Most Valued Data Science Skills </a:t>
             </a:r>
@@ -4952,7 +4979,7 @@
         <p:spPr>
           <a:xfrm>
             <a:off x="2438280" y="6019920"/>
-            <a:ext cx="6400080" cy="598680"/>
+            <a:ext cx="6399720" cy="598320"/>
           </a:xfrm>
           <a:prstGeom prst="rect">
             <a:avLst/>
@@ -4987,6 +5014,7 @@
                   </a:solidFill>
                 </a:uFill>
                 <a:latin typeface="Calibri"/>
+                <a:ea typeface="DejaVu Sans"/>
               </a:rPr>
               <a:t>Group 7</a:t>
             </a:r>
@@ -5019,6 +5047,7 @@
                   </a:solidFill>
                 </a:uFill>
                 <a:latin typeface="Calibri"/>
+                <a:ea typeface="DejaVu Sans"/>
               </a:rPr>
               <a:t>Albina Gallyavova, John Grando, Mehdi Khan, Olga Fornicheva, Yijian Lu,</a:t>
             </a:r>
@@ -5097,7 +5126,7 @@
         <p:spPr>
           <a:xfrm>
             <a:off x="609480" y="1143000"/>
-            <a:ext cx="7238160" cy="3651120"/>
+            <a:ext cx="7237800" cy="3650760"/>
           </a:xfrm>
           <a:prstGeom prst="rect">
             <a:avLst/>
@@ -5236,7 +5265,7 @@
             </a:endParaRPr>
           </a:p>
           <a:p>
-            <a:pPr marL="285840" indent="-285120">
+            <a:pPr marL="285840" indent="-284760">
               <a:lnSpc>
                 <a:spcPct val="100000"/>
               </a:lnSpc>
@@ -5292,7 +5321,7 @@
             </a:endParaRPr>
           </a:p>
           <a:p>
-            <a:pPr marL="285840" indent="-285120">
+            <a:pPr marL="285840" indent="-284760">
               <a:lnSpc>
                 <a:spcPct val="100000"/>
               </a:lnSpc>
@@ -5348,7 +5377,7 @@
             </a:endParaRPr>
           </a:p>
           <a:p>
-            <a:pPr marL="285840" indent="-285120">
+            <a:pPr marL="285840" indent="-284760">
               <a:lnSpc>
                 <a:spcPct val="100000"/>
               </a:lnSpc>
@@ -5445,7 +5474,7 @@
         <p:spPr>
           <a:xfrm>
             <a:off x="609480" y="380880"/>
-            <a:ext cx="7771680" cy="761400"/>
+            <a:ext cx="7771320" cy="761040"/>
           </a:xfrm>
           <a:prstGeom prst="rect">
             <a:avLst/>
@@ -5475,6 +5504,7 @@
                   </a:solidFill>
                 </a:uFill>
                 <a:latin typeface="Calibri"/>
+                <a:ea typeface="DejaVu Sans"/>
               </a:rPr>
               <a:t>Data 607, Fall 2017</a:t>
             </a:r>
@@ -5502,6 +5532,7 @@
                   </a:solidFill>
                 </a:uFill>
                 <a:latin typeface="Calibri"/>
+                <a:ea typeface="DejaVu Sans"/>
               </a:rPr>
               <a:t>Project 3 - </a:t>
             </a:r>
@@ -5516,6 +5547,7 @@
                   </a:solidFill>
                 </a:uFill>
                 <a:latin typeface="Calibri"/>
+                <a:ea typeface="DejaVu Sans"/>
               </a:rPr>
               <a:t>Most Valued Data Science Skills </a:t>
             </a:r>
@@ -5560,7 +5592,7 @@
         <p:spPr>
           <a:xfrm>
             <a:off x="2438280" y="6019920"/>
-            <a:ext cx="6400080" cy="598680"/>
+            <a:ext cx="6399720" cy="598320"/>
           </a:xfrm>
           <a:prstGeom prst="rect">
             <a:avLst/>
@@ -5595,6 +5627,7 @@
                   </a:solidFill>
                 </a:uFill>
                 <a:latin typeface="Calibri"/>
+                <a:ea typeface="DejaVu Sans"/>
               </a:rPr>
               <a:t>Group 7</a:t>
             </a:r>
@@ -5627,6 +5660,7 @@
                   </a:solidFill>
                 </a:uFill>
                 <a:latin typeface="Calibri"/>
+                <a:ea typeface="DejaVu Sans"/>
               </a:rPr>
               <a:t>Albina Gallyavova, John Grando, Mehdi Khan, Olga Fornicheva, Yijian Lu,</a:t>
             </a:r>
@@ -5705,7 +5739,7 @@
         <p:spPr>
           <a:xfrm>
             <a:off x="609480" y="1143000"/>
-            <a:ext cx="7238160" cy="638640"/>
+            <a:ext cx="7237800" cy="638280"/>
           </a:xfrm>
           <a:prstGeom prst="rect">
             <a:avLst/>
@@ -5789,7 +5823,7 @@
         <p:spPr>
           <a:xfrm>
             <a:off x="621000" y="1676520"/>
-            <a:ext cx="7731360" cy="3857040"/>
+            <a:ext cx="7731000" cy="3856680"/>
           </a:xfrm>
           <a:prstGeom prst="rect">
             <a:avLst/>
@@ -5857,7 +5891,7 @@
         <p:spPr>
           <a:xfrm>
             <a:off x="609480" y="380880"/>
-            <a:ext cx="7771680" cy="761400"/>
+            <a:ext cx="7771320" cy="761040"/>
           </a:xfrm>
           <a:prstGeom prst="rect">
             <a:avLst/>
@@ -5887,6 +5921,7 @@
                   </a:solidFill>
                 </a:uFill>
                 <a:latin typeface="Calibri"/>
+                <a:ea typeface="DejaVu Sans"/>
               </a:rPr>
               <a:t>Data 607, Fall 2017</a:t>
             </a:r>
@@ -5914,6 +5949,7 @@
                   </a:solidFill>
                 </a:uFill>
                 <a:latin typeface="Calibri"/>
+                <a:ea typeface="DejaVu Sans"/>
               </a:rPr>
               <a:t>Project 3 - </a:t>
             </a:r>
@@ -5928,6 +5964,7 @@
                   </a:solidFill>
                 </a:uFill>
                 <a:latin typeface="Calibri"/>
+                <a:ea typeface="DejaVu Sans"/>
               </a:rPr>
               <a:t>Most Valued Data Science Skills </a:t>
             </a:r>
@@ -5972,7 +6009,7 @@
         <p:spPr>
           <a:xfrm>
             <a:off x="2438280" y="6019920"/>
-            <a:ext cx="6400080" cy="598680"/>
+            <a:ext cx="6399720" cy="598320"/>
           </a:xfrm>
           <a:prstGeom prst="rect">
             <a:avLst/>
@@ -6007,6 +6044,7 @@
                   </a:solidFill>
                 </a:uFill>
                 <a:latin typeface="Calibri"/>
+                <a:ea typeface="DejaVu Sans"/>
               </a:rPr>
               <a:t>Group 7</a:t>
             </a:r>
@@ -6039,6 +6077,7 @@
                   </a:solidFill>
                 </a:uFill>
                 <a:latin typeface="Calibri"/>
+                <a:ea typeface="DejaVu Sans"/>
               </a:rPr>
               <a:t>Albina Gallyavova, John Grando, Mehdi Khan, Olga Fornicheva, Yijian Lu,</a:t>
             </a:r>
@@ -6117,7 +6156,7 @@
         <p:spPr>
           <a:xfrm>
             <a:off x="609480" y="990720"/>
-            <a:ext cx="7238160" cy="790560"/>
+            <a:ext cx="7237800" cy="790200"/>
           </a:xfrm>
           <a:prstGeom prst="rect">
             <a:avLst/>
@@ -6230,7 +6269,7 @@
         <p:spPr>
           <a:xfrm>
             <a:off x="155520" y="-3070080"/>
-            <a:ext cx="6400080" cy="6400080"/>
+            <a:ext cx="6399720" cy="6399720"/>
           </a:xfrm>
           <a:prstGeom prst="rect">
             <a:avLst/>
@@ -6256,7 +6295,7 @@
         <p:spPr>
           <a:xfrm>
             <a:off x="307800" y="-2917800"/>
-            <a:ext cx="6400080" cy="6400080"/>
+            <a:ext cx="6399720" cy="6399720"/>
           </a:xfrm>
           <a:prstGeom prst="rect">
             <a:avLst/>
@@ -6282,7 +6321,7 @@
         <p:spPr>
           <a:xfrm>
             <a:off x="460440" y="-2765520"/>
-            <a:ext cx="6400080" cy="6400080"/>
+            <a:ext cx="6399720" cy="6399720"/>
           </a:xfrm>
           <a:prstGeom prst="rect">
             <a:avLst/>
@@ -6312,7 +6351,7 @@
         <p:spPr>
           <a:xfrm>
             <a:off x="1464840" y="2062800"/>
-            <a:ext cx="6033240" cy="4063680"/>
+            <a:ext cx="6032880" cy="4063320"/>
           </a:xfrm>
           <a:prstGeom prst="rect">
             <a:avLst/>
@@ -6380,7 +6419,7 @@
         <p:spPr>
           <a:xfrm>
             <a:off x="609480" y="380880"/>
-            <a:ext cx="7771680" cy="761400"/>
+            <a:ext cx="7771320" cy="761040"/>
           </a:xfrm>
           <a:prstGeom prst="rect">
             <a:avLst/>
@@ -6410,6 +6449,7 @@
                   </a:solidFill>
                 </a:uFill>
                 <a:latin typeface="Calibri"/>
+                <a:ea typeface="DejaVu Sans"/>
               </a:rPr>
               <a:t>Data 607, Fall 2017</a:t>
             </a:r>
@@ -6437,6 +6477,7 @@
                   </a:solidFill>
                 </a:uFill>
                 <a:latin typeface="Calibri"/>
+                <a:ea typeface="DejaVu Sans"/>
               </a:rPr>
               <a:t>Project 3 - </a:t>
             </a:r>
@@ -6451,6 +6492,7 @@
                   </a:solidFill>
                 </a:uFill>
                 <a:latin typeface="Calibri"/>
+                <a:ea typeface="DejaVu Sans"/>
               </a:rPr>
               <a:t>Most Valued Data Science Skills </a:t>
             </a:r>
@@ -6495,7 +6537,7 @@
         <p:spPr>
           <a:xfrm>
             <a:off x="2438280" y="6019920"/>
-            <a:ext cx="6400080" cy="598680"/>
+            <a:ext cx="6399720" cy="598320"/>
           </a:xfrm>
           <a:prstGeom prst="rect">
             <a:avLst/>
@@ -6530,6 +6572,7 @@
                   </a:solidFill>
                 </a:uFill>
                 <a:latin typeface="Calibri"/>
+                <a:ea typeface="DejaVu Sans"/>
               </a:rPr>
               <a:t>Group 7</a:t>
             </a:r>
@@ -6562,6 +6605,7 @@
                   </a:solidFill>
                 </a:uFill>
                 <a:latin typeface="Calibri"/>
+                <a:ea typeface="DejaVu Sans"/>
               </a:rPr>
               <a:t>Albina Gallyavova, John Grando, Mehdi Khan, Olga Fornicheva, Yijian Lu,</a:t>
             </a:r>
@@ -6640,7 +6684,7 @@
         <p:spPr>
           <a:xfrm>
             <a:off x="609480" y="990720"/>
-            <a:ext cx="7238160" cy="1003680"/>
+            <a:ext cx="7237800" cy="1003320"/>
           </a:xfrm>
           <a:prstGeom prst="rect">
             <a:avLst/>
@@ -6753,7 +6797,7 @@
         <p:spPr>
           <a:xfrm>
             <a:off x="155520" y="-3070080"/>
-            <a:ext cx="6400080" cy="6400080"/>
+            <a:ext cx="6399720" cy="6399720"/>
           </a:xfrm>
           <a:prstGeom prst="rect">
             <a:avLst/>
@@ -6779,7 +6823,7 @@
         <p:spPr>
           <a:xfrm>
             <a:off x="307800" y="-2917800"/>
-            <a:ext cx="6400080" cy="6400080"/>
+            <a:ext cx="6399720" cy="6399720"/>
           </a:xfrm>
           <a:prstGeom prst="rect">
             <a:avLst/>
@@ -6805,7 +6849,7 @@
         <p:spPr>
           <a:xfrm>
             <a:off x="460440" y="-2765520"/>
-            <a:ext cx="6400080" cy="6400080"/>
+            <a:ext cx="6399720" cy="6399720"/>
           </a:xfrm>
           <a:prstGeom prst="rect">
             <a:avLst/>
@@ -6836,7 +6880,7 @@
         <p:spPr>
           <a:xfrm>
             <a:off x="1371600" y="2286000"/>
-            <a:ext cx="5610600" cy="3906000"/>
+            <a:ext cx="5610240" cy="3905640"/>
           </a:xfrm>
           <a:prstGeom prst="rect">
             <a:avLst/>
@@ -6904,7 +6948,7 @@
         <p:spPr>
           <a:xfrm>
             <a:off x="609480" y="380880"/>
-            <a:ext cx="7771680" cy="761400"/>
+            <a:ext cx="7771320" cy="761040"/>
           </a:xfrm>
           <a:prstGeom prst="rect">
             <a:avLst/>
@@ -6934,6 +6978,7 @@
                   </a:solidFill>
                 </a:uFill>
                 <a:latin typeface="Calibri"/>
+                <a:ea typeface="DejaVu Sans"/>
               </a:rPr>
               <a:t>Data 607, Fall 2017</a:t>
             </a:r>
@@ -6961,6 +7006,7 @@
                   </a:solidFill>
                 </a:uFill>
                 <a:latin typeface="Calibri"/>
+                <a:ea typeface="DejaVu Sans"/>
               </a:rPr>
               <a:t>Project 3 - </a:t>
             </a:r>
@@ -6975,6 +7021,7 @@
                   </a:solidFill>
                 </a:uFill>
                 <a:latin typeface="Calibri"/>
+                <a:ea typeface="DejaVu Sans"/>
               </a:rPr>
               <a:t>Most Valued Data Science Skills </a:t>
             </a:r>
@@ -7019,7 +7066,7 @@
         <p:spPr>
           <a:xfrm>
             <a:off x="2438280" y="6019920"/>
-            <a:ext cx="6400080" cy="598680"/>
+            <a:ext cx="6399720" cy="598320"/>
           </a:xfrm>
           <a:prstGeom prst="rect">
             <a:avLst/>
@@ -7054,6 +7101,7 @@
                   </a:solidFill>
                 </a:uFill>
                 <a:latin typeface="Calibri"/>
+                <a:ea typeface="DejaVu Sans"/>
               </a:rPr>
               <a:t>Group 7</a:t>
             </a:r>
@@ -7086,6 +7134,7 @@
                   </a:solidFill>
                 </a:uFill>
                 <a:latin typeface="Calibri"/>
+                <a:ea typeface="DejaVu Sans"/>
               </a:rPr>
               <a:t>Albina Gallyavova, John Grando, Mehdi Khan, Olga Fornicheva, Yijian Lu,</a:t>
             </a:r>
@@ -7164,7 +7213,7 @@
         <p:spPr>
           <a:xfrm>
             <a:off x="609480" y="990720"/>
-            <a:ext cx="7238160" cy="790560"/>
+            <a:ext cx="7237800" cy="790200"/>
           </a:xfrm>
           <a:prstGeom prst="rect">
             <a:avLst/>
@@ -7277,7 +7326,7 @@
         <p:spPr>
           <a:xfrm>
             <a:off x="155520" y="-3070080"/>
-            <a:ext cx="6400080" cy="6400080"/>
+            <a:ext cx="6399720" cy="6399720"/>
           </a:xfrm>
           <a:prstGeom prst="rect">
             <a:avLst/>
@@ -7303,7 +7352,7 @@
         <p:spPr>
           <a:xfrm>
             <a:off x="307800" y="-2917800"/>
-            <a:ext cx="6400080" cy="6400080"/>
+            <a:ext cx="6399720" cy="6399720"/>
           </a:xfrm>
           <a:prstGeom prst="rect">
             <a:avLst/>
@@ -7329,7 +7378,7 @@
         <p:spPr>
           <a:xfrm>
             <a:off x="460440" y="-2765520"/>
-            <a:ext cx="6400080" cy="6400080"/>
+            <a:ext cx="6399720" cy="6399720"/>
           </a:xfrm>
           <a:prstGeom prst="rect">
             <a:avLst/>
@@ -7359,7 +7408,7 @@
         <p:spPr>
           <a:xfrm>
             <a:off x="1234440" y="2081160"/>
-            <a:ext cx="5897880" cy="4136760"/>
+            <a:ext cx="5897520" cy="4136400"/>
           </a:xfrm>
           <a:prstGeom prst="rect">
             <a:avLst/>

</xml_diff>